<commit_message>
[Presentation] Presentation created through GPT prompt
</commit_message>
<xml_diff>
--- a/presentation/example_presentation.pptx
+++ b/presentation/example_presentation.pptx
@@ -3659,25 +3659,18 @@
           </a:p>
         </p:txBody>
       </p:sp>
-      <p:pic>
-        <p:nvPicPr>
-          <p:cNvPr id="3" name="Picture Placeholder 2" descr="segmentation.png"/>
-          <p:cNvPicPr>
-            <a:picLocks noGrp="1" noChangeAspect="1"/>
-          </p:cNvPicPr>
+      <p:sp>
+        <p:nvSpPr>
+          <p:cNvPr id="3" name="Picture Placeholder 2"/>
+          <p:cNvSpPr>
+            <a:spLocks noGrp="1"/>
+          </p:cNvSpPr>
           <p:nvPr>
             <p:ph type="pic" idx="1"/>
           </p:nvPr>
-        </p:nvPicPr>
-        <p:blipFill>
-          <a:blip r:embed="rId2"/>
-          <a:srcRect/>
-          <a:stretch>
-            <a:fillRect/>
-          </a:stretch>
-        </p:blipFill>
-        <p:spPr/>
-      </p:pic>
+        </p:nvSpPr>
+        <p:spPr/>
+      </p:sp>
       <p:sp>
         <p:nvSpPr>
           <p:cNvPr id="4" name="Text Placeholder 3"/>
@@ -3692,11 +3685,7 @@
         <p:txBody>
           <a:bodyPr/>
           <a:lstStyle/>
-          <a:p>
-            <a:r>
-              <a:t>Picture with Caption</a:t>
-            </a:r>
-          </a:p>
+          <a:p/>
         </p:txBody>
       </p:sp>
     </p:spTree>

</xml_diff>